<commit_message>
actualización presentación sprint 2
Cambios en conclusiones y actividades generales, se define más aún lo logrado.
</commit_message>
<xml_diff>
--- a/burndown y trabajo de equipo/Sprint 2 Finalizado/Presentacion Sprint 2.pptx
+++ b/burndown y trabajo de equipo/Sprint 2 Finalizado/Presentacion Sprint 2.pptx
@@ -116,6 +116,11 @@
       </a:defRPr>
     </a:lvl9pPr>
   </p:defaultTextStyle>
+  <p:extLst>
+    <p:ext uri="{EFAFB233-063F-42B5-8137-9DF3F51BA10A}">
+      <p15:sldGuideLst xmlns:p15="http://schemas.microsoft.com/office/powerpoint/2012/main"/>
+    </p:ext>
+  </p:extLst>
 </p:presentation>
 </file>
 
@@ -5862,7 +5867,23 @@
                   <a:schemeClr val="dk1"/>
                 </a:solidFill>
               </a:rPr>
-              <a:t>Sprint 1: Proyecto Taller de Integración</a:t>
+              <a:t>Sprint </a:t>
+            </a:r>
+            <a:r>
+              <a:rPr lang="es-ES" sz="4400" dirty="0" smtClean="0">
+                <a:solidFill>
+                  <a:schemeClr val="dk1"/>
+                </a:solidFill>
+              </a:rPr>
+              <a:t>2: </a:t>
+            </a:r>
+            <a:r>
+              <a:rPr lang="es-ES" sz="4400" dirty="0">
+                <a:solidFill>
+                  <a:schemeClr val="dk1"/>
+                </a:solidFill>
+              </a:rPr>
+              <a:t>Proyecto Taller de Integración</a:t>
             </a:r>
             <a:endParaRPr lang="en-US" sz="4400" dirty="0"/>
           </a:p>
@@ -6058,6 +6079,13 @@
   <p:clrMapOvr>
     <a:masterClrMapping/>
   </p:clrMapOvr>
+  <p:timing>
+    <p:tnLst>
+      <p:par>
+        <p:cTn id="1" dur="indefinite" restart="never" nodeType="tmRoot"/>
+      </p:par>
+    </p:tnLst>
+  </p:timing>
 </p:sld>
 </file>
 
@@ -6090,8 +6118,8 @@
         </p:nvSpPr>
         <p:spPr>
           <a:xfrm>
-            <a:off x="2689014" y="139337"/>
-            <a:ext cx="8596668" cy="1320800"/>
+            <a:off x="487680" y="252549"/>
+            <a:ext cx="9944562" cy="1320800"/>
           </a:xfrm>
         </p:spPr>
         <p:txBody>
@@ -6100,7 +6128,7 @@
           <a:p>
             <a:r>
               <a:rPr lang="es-ES" dirty="0" smtClean="0"/>
-              <a:t>Semana 1 SPRINT 3.</a:t>
+              <a:t>SPRINT 3, Semana 1 (Próximas actividades)</a:t>
             </a:r>
             <a:endParaRPr lang="en-US" dirty="0"/>
           </a:p>
@@ -7751,7 +7779,15 @@
           <a:p>
             <a:r>
               <a:rPr lang="es-ES" dirty="0" smtClean="0"/>
-              <a:t>Se implementó los menú de combo y puntuación.</a:t>
+              <a:t>Se implementó los </a:t>
+            </a:r>
+            <a:r>
+              <a:rPr lang="es-ES" dirty="0" smtClean="0"/>
+              <a:t>contadores en pantalla / </a:t>
+            </a:r>
+            <a:r>
+              <a:rPr lang="es-ES" dirty="0" smtClean="0"/>
+              <a:t>puntuación.</a:t>
             </a:r>
           </a:p>
           <a:p>
@@ -7763,7 +7799,25 @@
           <a:p>
             <a:r>
               <a:rPr lang="es-ES" dirty="0" smtClean="0"/>
-              <a:t>Se implementó reacción al golpear enemigos.</a:t>
+              <a:t>Se implementó reacción al golpear enemigos</a:t>
+            </a:r>
+            <a:r>
+              <a:rPr lang="es-ES" dirty="0" smtClean="0"/>
+              <a:t>.</a:t>
+            </a:r>
+          </a:p>
+          <a:p>
+            <a:r>
+              <a:rPr lang="es-ES" dirty="0" smtClean="0"/>
+              <a:t>Se implementó las mecánicas para hacerlo </a:t>
+            </a:r>
+            <a:r>
+              <a:rPr lang="es-ES" dirty="0" err="1" smtClean="0"/>
+              <a:t>jugable</a:t>
+            </a:r>
+            <a:r>
+              <a:rPr lang="es-ES" dirty="0"/>
+              <a:t>.</a:t>
             </a:r>
             <a:endParaRPr lang="en-US" dirty="0"/>
           </a:p>
@@ -7849,7 +7903,7 @@
         </p:spPr>
         <p:txBody>
           <a:bodyPr>
-            <a:normAutofit lnSpcReduction="10000"/>
+            <a:normAutofit fontScale="92500" lnSpcReduction="20000"/>
           </a:bodyPr>
           <a:lstStyle/>
           <a:p>
@@ -8156,6 +8210,38 @@
               <a:buFont typeface="Wingdings 3" charset="2"/>
               <a:buChar char="▶"/>
             </a:pPr>
+            <a:r>
+              <a:rPr lang="es-ES" dirty="0" smtClean="0">
+                <a:solidFill>
+                  <a:schemeClr val="tx1"/>
+                </a:solidFill>
+              </a:rPr>
+              <a:t>Ingresar mecánica de puntos y tiempo. </a:t>
+            </a:r>
+            <a:r>
+              <a:rPr lang="es-ES" dirty="0" smtClean="0">
+                <a:solidFill>
+                  <a:schemeClr val="accent2">
+                    <a:lumMod val="75000"/>
+                  </a:schemeClr>
+                </a:solidFill>
+              </a:rPr>
+              <a:t>[REALIZADO]</a:t>
+            </a:r>
+            <a:endParaRPr lang="es-ES" dirty="0" smtClean="0">
+              <a:solidFill>
+                <a:schemeClr val="accent2">
+                  <a:lumMod val="75000"/>
+                </a:schemeClr>
+              </a:solidFill>
+            </a:endParaRPr>
+          </a:p>
+          <a:p>
+            <a:pPr>
+              <a:buSzPts val="1440"/>
+              <a:buFont typeface="Wingdings 3" charset="2"/>
+              <a:buChar char="▶"/>
+            </a:pPr>
             <a:endParaRPr lang="es-ES" dirty="0"/>
           </a:p>
           <a:p>
@@ -8169,7 +8255,31 @@
                   <a:schemeClr val="tx1"/>
                 </a:solidFill>
               </a:rPr>
-              <a:t>Crear un prototipo más desarrollado con funciones sprint 1 y 2. </a:t>
+              <a:t>Crear un prototipo más desarrollado con funciones sprint 1 y </a:t>
+            </a:r>
+            <a:r>
+              <a:rPr lang="es-ES" b="1" dirty="0" smtClean="0">
+                <a:solidFill>
+                  <a:schemeClr val="tx1"/>
+                </a:solidFill>
+              </a:rPr>
+              <a:t>2 (</a:t>
+            </a:r>
+            <a:r>
+              <a:rPr lang="es-ES" b="1" dirty="0" err="1" smtClean="0">
+                <a:solidFill>
+                  <a:schemeClr val="tx1"/>
+                </a:solidFill>
+              </a:rPr>
+              <a:t>Jugable</a:t>
+            </a:r>
+            <a:r>
+              <a:rPr lang="es-ES" b="1" dirty="0" smtClean="0">
+                <a:solidFill>
+                  <a:schemeClr val="tx1"/>
+                </a:solidFill>
+              </a:rPr>
+              <a:t>). </a:t>
             </a:r>
             <a:r>
               <a:rPr lang="es-ES" dirty="0" smtClean="0">
@@ -8210,6 +8320,13 @@
   <p:clrMapOvr>
     <a:masterClrMapping/>
   </p:clrMapOvr>
+  <p:timing>
+    <p:tnLst>
+      <p:par>
+        <p:cTn id="1" dur="indefinite" restart="never" nodeType="tmRoot"/>
+      </p:par>
+    </p:tnLst>
+  </p:timing>
 </p:sld>
 </file>
 
@@ -8440,6 +8557,13 @@
   <p:clrMapOvr>
     <a:masterClrMapping/>
   </p:clrMapOvr>
+  <p:timing>
+    <p:tnLst>
+      <p:par>
+        <p:cTn id="1" dur="indefinite" restart="never" nodeType="tmRoot"/>
+      </p:par>
+    </p:tnLst>
+  </p:timing>
 </p:sld>
 </file>
 
@@ -8503,7 +8627,7 @@
         <p:spPr>
           <a:xfrm>
             <a:off x="5221927" y="4661647"/>
-            <a:ext cx="5661226" cy="2383762"/>
+            <a:ext cx="6099216" cy="2383762"/>
           </a:xfrm>
         </p:spPr>
         <p:txBody>
@@ -8517,12 +8641,12 @@
           </a:p>
           <a:p>
             <a:r>
-              <a:rPr lang="es-ES" dirty="0" err="1" smtClean="0"/>
-              <a:t>Implementacion</a:t>
-            </a:r>
-            <a:r>
               <a:rPr lang="es-ES" dirty="0" smtClean="0"/>
-              <a:t> de colisiones [Realizado]</a:t>
+              <a:t>Implementación </a:t>
+            </a:r>
+            <a:r>
+              <a:rPr lang="es-ES" dirty="0" smtClean="0"/>
+              <a:t>de colisiones [Realizado]</a:t>
             </a:r>
           </a:p>
           <a:p>
@@ -8531,12 +8655,12 @@
               <a:t>Diseño de partículas [Error de </a:t>
             </a:r>
             <a:r>
-              <a:rPr lang="es-ES" dirty="0" err="1" smtClean="0"/>
-              <a:t>caract</a:t>
-            </a:r>
-            <a:r>
               <a:rPr lang="es-ES" dirty="0" smtClean="0"/>
-              <a:t>, rediseño]</a:t>
+              <a:t>definición, </a:t>
+            </a:r>
+            <a:r>
+              <a:rPr lang="es-ES" dirty="0" smtClean="0"/>
+              <a:t>rediseño]</a:t>
             </a:r>
           </a:p>
           <a:p>
@@ -8680,6 +8804,13 @@
   <p:clrMapOvr>
     <a:masterClrMapping/>
   </p:clrMapOvr>
+  <p:timing>
+    <p:tnLst>
+      <p:par>
+        <p:cTn id="1" dur="indefinite" restart="never" nodeType="tmRoot"/>
+      </p:par>
+    </p:tnLst>
+  </p:timing>
 </p:sld>
 </file>
 
@@ -8912,6 +9043,13 @@
   <p:clrMapOvr>
     <a:masterClrMapping/>
   </p:clrMapOvr>
+  <p:timing>
+    <p:tnLst>
+      <p:par>
+        <p:cTn id="1" dur="indefinite" restart="never" nodeType="tmRoot"/>
+      </p:par>
+    </p:tnLst>
+  </p:timing>
 </p:sld>
 </file>
 
@@ -10159,6 +10297,36 @@
           </a:p>
         </p:txBody>
       </p:sp>
+      <p:sp>
+        <p:nvSpPr>
+          <p:cNvPr id="13" name="CuadroTexto 12"/>
+          <p:cNvSpPr txBox="1"/>
+          <p:nvPr/>
+        </p:nvSpPr>
+        <p:spPr>
+          <a:xfrm>
+            <a:off x="5442857" y="5067525"/>
+            <a:ext cx="4876800" cy="1200329"/>
+          </a:xfrm>
+          <a:prstGeom prst="rect">
+            <a:avLst/>
+          </a:prstGeom>
+          <a:noFill/>
+        </p:spPr>
+        <p:txBody>
+          <a:bodyPr wrap="square" rtlCol="0">
+            <a:spAutoFit/>
+          </a:bodyPr>
+          <a:lstStyle/>
+          <a:p>
+            <a:r>
+              <a:rPr lang="es-ES" dirty="0" smtClean="0"/>
+              <a:t>Todos los integrantes cumplieron de manera responsable las actividades propuestas en las reuniones de grupo, dejando constancia de las horas reales trabajadas y las estipuladas.</a:t>
+            </a:r>
+            <a:endParaRPr lang="en-US" dirty="0"/>
+          </a:p>
+        </p:txBody>
+      </p:sp>
     </p:spTree>
     <p:extLst>
       <p:ext uri="{BB962C8B-B14F-4D97-AF65-F5344CB8AC3E}">
@@ -10231,15 +10399,21 @@
         </p:nvSpPr>
         <p:spPr>
           <a:xfrm>
-            <a:off x="9858102" y="4511040"/>
-            <a:ext cx="2803533" cy="1155853"/>
+            <a:off x="5890546" y="5449613"/>
+            <a:ext cx="3976265" cy="1155853"/>
           </a:xfrm>
         </p:spPr>
         <p:txBody>
-          <a:bodyPr/>
+          <a:bodyPr>
+            <a:normAutofit/>
+          </a:bodyPr>
           <a:lstStyle/>
           <a:p>
-            <a:endParaRPr lang="en-US"/>
+            <a:r>
+              <a:rPr lang="es-ES" dirty="0" smtClean="0"/>
+              <a:t>Todos los integrantes del grupo cumplieron las horas requeridas del presente sprint.</a:t>
+            </a:r>
+            <a:endParaRPr lang="en-US" dirty="0"/>
           </a:p>
         </p:txBody>
       </p:sp>
@@ -11741,7 +11915,12 @@
             <p:ph idx="1"/>
           </p:nvPr>
         </p:nvSpPr>
-        <p:spPr/>
+        <p:spPr>
+          <a:xfrm>
+            <a:off x="677334" y="2160589"/>
+            <a:ext cx="6446277" cy="3880773"/>
+          </a:xfrm>
+        </p:spPr>
         <p:txBody>
           <a:bodyPr/>
           <a:lstStyle/>
@@ -11791,13 +11970,57 @@
         <p:spPr>
           <a:xfrm>
             <a:off x="1128931" y="3509553"/>
-            <a:ext cx="8523824" cy="2978387"/>
+            <a:ext cx="4644852" cy="2978387"/>
           </a:xfrm>
           <a:prstGeom prst="rect">
             <a:avLst/>
           </a:prstGeom>
         </p:spPr>
       </p:pic>
+      <p:sp>
+        <p:nvSpPr>
+          <p:cNvPr id="6" name="CuadroTexto 5"/>
+          <p:cNvSpPr txBox="1"/>
+          <p:nvPr/>
+        </p:nvSpPr>
+        <p:spPr>
+          <a:xfrm>
+            <a:off x="7575208" y="4260082"/>
+            <a:ext cx="4180115" cy="1754326"/>
+          </a:xfrm>
+          <a:prstGeom prst="rect">
+            <a:avLst/>
+          </a:prstGeom>
+          <a:noFill/>
+        </p:spPr>
+        <p:txBody>
+          <a:bodyPr wrap="square" rtlCol="0">
+            <a:spAutoFit/>
+          </a:bodyPr>
+          <a:lstStyle/>
+          <a:p>
+            <a:r>
+              <a:rPr lang="es-ES" dirty="0" smtClean="0"/>
+              <a:t>Conclusión del sprint:</a:t>
+            </a:r>
+          </a:p>
+          <a:p>
+            <a:r>
+              <a:rPr lang="es-ES" dirty="0" smtClean="0"/>
+              <a:t> Si bien se trabajaron menos horas “extra” este sprint, el avance fue considerable y la estructura del proyecto esta mucho más definida, incluso </a:t>
+            </a:r>
+            <a:r>
+              <a:rPr lang="es-ES" dirty="0" err="1" smtClean="0"/>
+              <a:t>jugable</a:t>
+            </a:r>
+            <a:r>
+              <a:rPr lang="es-ES" dirty="0" smtClean="0"/>
+              <a:t>.</a:t>
+            </a:r>
+            <a:endParaRPr lang="en-US" dirty="0"/>
+          </a:p>
+        </p:txBody>
+      </p:sp>
     </p:spTree>
     <p:extLst>
       <p:ext uri="{BB962C8B-B14F-4D97-AF65-F5344CB8AC3E}">
@@ -11983,7 +12206,23 @@
                   <a:schemeClr val="tx1"/>
                 </a:solidFill>
               </a:rPr>
-              <a:t>Lograr tener un “prototipo” final de lo que será el juego. </a:t>
+              <a:t>Lograr tener un “prototipo” final </a:t>
+            </a:r>
+            <a:r>
+              <a:rPr lang="es-ES" b="1" dirty="0" smtClean="0">
+                <a:solidFill>
+                  <a:schemeClr val="tx1"/>
+                </a:solidFill>
+              </a:rPr>
+              <a:t>del juego</a:t>
+            </a:r>
+            <a:r>
+              <a:rPr lang="es-ES" b="1" dirty="0" smtClean="0">
+                <a:solidFill>
+                  <a:schemeClr val="tx1"/>
+                </a:solidFill>
+              </a:rPr>
+              <a:t>. </a:t>
             </a:r>
             <a:r>
               <a:rPr lang="es-ES" dirty="0">

</xml_diff>